<commit_message>
Revert "Revert "add pix""
This reverts commit 9798ea498e9af56fdf79ffa0b8df27bc605ce4a9.
</commit_message>
<xml_diff>
--- a/assets/logos/visual_elements.pptx
+++ b/assets/logos/visual_elements.pptx
@@ -9,6 +9,7 @@
     <p:sldId id="257" r:id="rId3"/>
     <p:sldId id="260" r:id="rId4"/>
     <p:sldId id="261" r:id="rId5"/>
+    <p:sldId id="262" r:id="rId6"/>
   </p:sldIdLst>
   <p:sldSz cx="12192000" cy="6858000"/>
   <p:notesSz cx="6858000" cy="9144000"/>
@@ -1315,7 +1316,7 @@
           <a:p>
             <a:fld id="{31B638F6-9E2C-4E9D-9E14-B73210A544E1}" type="datetimeFigureOut">
               <a:rPr lang="en-CA" smtClean="0"/>
-              <a:t>2022-11-13</a:t>
+              <a:t>2022-12-08</a:t>
             </a:fld>
             <a:endParaRPr lang="en-CA"/>
           </a:p>
@@ -1515,7 +1516,7 @@
           <a:p>
             <a:fld id="{31B638F6-9E2C-4E9D-9E14-B73210A544E1}" type="datetimeFigureOut">
               <a:rPr lang="en-CA" smtClean="0"/>
-              <a:t>2022-11-13</a:t>
+              <a:t>2022-12-08</a:t>
             </a:fld>
             <a:endParaRPr lang="en-CA"/>
           </a:p>
@@ -1725,7 +1726,7 @@
           <a:p>
             <a:fld id="{31B638F6-9E2C-4E9D-9E14-B73210A544E1}" type="datetimeFigureOut">
               <a:rPr lang="en-CA" smtClean="0"/>
-              <a:t>2022-11-13</a:t>
+              <a:t>2022-12-08</a:t>
             </a:fld>
             <a:endParaRPr lang="en-CA"/>
           </a:p>
@@ -1925,7 +1926,7 @@
           <a:p>
             <a:fld id="{31B638F6-9E2C-4E9D-9E14-B73210A544E1}" type="datetimeFigureOut">
               <a:rPr lang="en-CA" smtClean="0"/>
-              <a:t>2022-11-13</a:t>
+              <a:t>2022-12-08</a:t>
             </a:fld>
             <a:endParaRPr lang="en-CA"/>
           </a:p>
@@ -2201,7 +2202,7 @@
           <a:p>
             <a:fld id="{31B638F6-9E2C-4E9D-9E14-B73210A544E1}" type="datetimeFigureOut">
               <a:rPr lang="en-CA" smtClean="0"/>
-              <a:t>2022-11-13</a:t>
+              <a:t>2022-12-08</a:t>
             </a:fld>
             <a:endParaRPr lang="en-CA"/>
           </a:p>
@@ -2469,7 +2470,7 @@
           <a:p>
             <a:fld id="{31B638F6-9E2C-4E9D-9E14-B73210A544E1}" type="datetimeFigureOut">
               <a:rPr lang="en-CA" smtClean="0"/>
-              <a:t>2022-11-13</a:t>
+              <a:t>2022-12-08</a:t>
             </a:fld>
             <a:endParaRPr lang="en-CA"/>
           </a:p>
@@ -2884,7 +2885,7 @@
           <a:p>
             <a:fld id="{31B638F6-9E2C-4E9D-9E14-B73210A544E1}" type="datetimeFigureOut">
               <a:rPr lang="en-CA" smtClean="0"/>
-              <a:t>2022-11-13</a:t>
+              <a:t>2022-12-08</a:t>
             </a:fld>
             <a:endParaRPr lang="en-CA"/>
           </a:p>
@@ -3026,7 +3027,7 @@
           <a:p>
             <a:fld id="{31B638F6-9E2C-4E9D-9E14-B73210A544E1}" type="datetimeFigureOut">
               <a:rPr lang="en-CA" smtClean="0"/>
-              <a:t>2022-11-13</a:t>
+              <a:t>2022-12-08</a:t>
             </a:fld>
             <a:endParaRPr lang="en-CA"/>
           </a:p>
@@ -3139,7 +3140,7 @@
           <a:p>
             <a:fld id="{31B638F6-9E2C-4E9D-9E14-B73210A544E1}" type="datetimeFigureOut">
               <a:rPr lang="en-CA" smtClean="0"/>
-              <a:t>2022-11-13</a:t>
+              <a:t>2022-12-08</a:t>
             </a:fld>
             <a:endParaRPr lang="en-CA"/>
           </a:p>
@@ -3452,7 +3453,7 @@
           <a:p>
             <a:fld id="{31B638F6-9E2C-4E9D-9E14-B73210A544E1}" type="datetimeFigureOut">
               <a:rPr lang="en-CA" smtClean="0"/>
-              <a:t>2022-11-13</a:t>
+              <a:t>2022-12-08</a:t>
             </a:fld>
             <a:endParaRPr lang="en-CA"/>
           </a:p>
@@ -3741,7 +3742,7 @@
           <a:p>
             <a:fld id="{31B638F6-9E2C-4E9D-9E14-B73210A544E1}" type="datetimeFigureOut">
               <a:rPr lang="en-CA" smtClean="0"/>
-              <a:t>2022-11-13</a:t>
+              <a:t>2022-12-08</a:t>
             </a:fld>
             <a:endParaRPr lang="en-CA"/>
           </a:p>
@@ -3984,7 +3985,7 @@
           <a:p>
             <a:fld id="{31B638F6-9E2C-4E9D-9E14-B73210A544E1}" type="datetimeFigureOut">
               <a:rPr lang="en-CA" smtClean="0"/>
-              <a:t>2022-11-13</a:t>
+              <a:t>2022-12-08</a:t>
             </a:fld>
             <a:endParaRPr lang="en-CA"/>
           </a:p>
@@ -5112,6 +5113,256 @@
 </p:sld>
 </file>
 
+<file path=ppt/slides/slide5.xml><?xml version="1.0" encoding="utf-8"?>
+<p:sld xmlns:a="http://schemas.openxmlformats.org/drawingml/2006/main" xmlns:r="http://schemas.openxmlformats.org/officeDocument/2006/relationships" xmlns:p="http://schemas.openxmlformats.org/presentationml/2006/main">
+  <p:cSld>
+    <p:spTree>
+      <p:nvGrpSpPr>
+        <p:cNvPr id="1" name=""/>
+        <p:cNvGrpSpPr/>
+        <p:nvPr/>
+      </p:nvGrpSpPr>
+      <p:grpSpPr>
+        <a:xfrm>
+          <a:off x="0" y="0"/>
+          <a:ext cx="0" cy="0"/>
+          <a:chOff x="0" y="0"/>
+          <a:chExt cx="0" cy="0"/>
+        </a:xfrm>
+      </p:grpSpPr>
+      <p:pic>
+        <p:nvPicPr>
+          <p:cNvPr id="5" name="Graphic 4">
+            <a:extLst>
+              <a:ext uri="{FF2B5EF4-FFF2-40B4-BE49-F238E27FC236}">
+                <a16:creationId xmlns:a16="http://schemas.microsoft.com/office/drawing/2014/main" id="{A3DF2D35-1B46-994B-552A-5FE274983AD3}"/>
+              </a:ext>
+            </a:extLst>
+          </p:cNvPr>
+          <p:cNvPicPr>
+            <a:picLocks noChangeAspect="1"/>
+          </p:cNvPicPr>
+          <p:nvPr/>
+        </p:nvPicPr>
+        <p:blipFill>
+          <a:blip r:embed="rId2">
+            <a:extLst>
+              <a:ext uri="{28A0092B-C50C-407E-A947-70E740481C1C}">
+                <a14:useLocalDpi xmlns:a14="http://schemas.microsoft.com/office/drawing/2010/main" val="0"/>
+              </a:ext>
+              <a:ext uri="{96DAC541-7B7A-43D3-8B79-37D633B846F1}">
+                <asvg:svgBlip xmlns:asvg="http://schemas.microsoft.com/office/drawing/2016/SVG/main" r:embed="rId3"/>
+              </a:ext>
+            </a:extLst>
+          </a:blip>
+          <a:stretch>
+            <a:fillRect/>
+          </a:stretch>
+        </p:blipFill>
+        <p:spPr>
+          <a:xfrm>
+            <a:off x="2344992" y="2563924"/>
+            <a:ext cx="9197213" cy="1886491"/>
+          </a:xfrm>
+          <a:prstGeom prst="rect">
+            <a:avLst/>
+          </a:prstGeom>
+        </p:spPr>
+      </p:pic>
+      <p:pic>
+        <p:nvPicPr>
+          <p:cNvPr id="1026" name="Picture 2" descr="Image result for iase logo">
+            <a:extLst>
+              <a:ext uri="{FF2B5EF4-FFF2-40B4-BE49-F238E27FC236}">
+                <a16:creationId xmlns:a16="http://schemas.microsoft.com/office/drawing/2014/main" id="{AE3E041D-0457-8F13-548A-D35A8EF9B4EF}"/>
+              </a:ext>
+            </a:extLst>
+          </p:cNvPr>
+          <p:cNvPicPr>
+            <a:picLocks noChangeAspect="1" noChangeArrowheads="1"/>
+          </p:cNvPicPr>
+          <p:nvPr/>
+        </p:nvPicPr>
+        <p:blipFill>
+          <a:blip r:embed="rId4">
+            <a:extLst>
+              <a:ext uri="{28A0092B-C50C-407E-A947-70E740481C1C}">
+                <a14:useLocalDpi xmlns:a14="http://schemas.microsoft.com/office/drawing/2010/main" val="0"/>
+              </a:ext>
+            </a:extLst>
+          </a:blip>
+          <a:srcRect/>
+          <a:stretch>
+            <a:fillRect/>
+          </a:stretch>
+        </p:blipFill>
+        <p:spPr bwMode="auto">
+          <a:xfrm>
+            <a:off x="10047896" y="1854210"/>
+            <a:ext cx="1370293" cy="850284"/>
+          </a:xfrm>
+          <a:prstGeom prst="rect">
+            <a:avLst/>
+          </a:prstGeom>
+          <a:noFill/>
+          <a:extLst>
+            <a:ext uri="{909E8E84-426E-40DD-AFC4-6F175D3DCCD1}">
+              <a14:hiddenFill xmlns:a14="http://schemas.microsoft.com/office/drawing/2010/main">
+                <a:solidFill>
+                  <a:srgbClr val="FFFFFF"/>
+                </a:solidFill>
+              </a14:hiddenFill>
+            </a:ext>
+          </a:extLst>
+        </p:spPr>
+      </p:pic>
+      <p:sp>
+        <p:nvSpPr>
+          <p:cNvPr id="11" name="TextBox 10">
+            <a:extLst>
+              <a:ext uri="{FF2B5EF4-FFF2-40B4-BE49-F238E27FC236}">
+                <a16:creationId xmlns:a16="http://schemas.microsoft.com/office/drawing/2014/main" id="{6D0D5F23-DD92-2CFE-004F-DD05622AD2FE}"/>
+              </a:ext>
+            </a:extLst>
+          </p:cNvPr>
+          <p:cNvSpPr txBox="1"/>
+          <p:nvPr/>
+        </p:nvSpPr>
+        <p:spPr>
+          <a:xfrm>
+            <a:off x="2344992" y="1615946"/>
+            <a:ext cx="7766870" cy="800219"/>
+          </a:xfrm>
+          <a:prstGeom prst="rect">
+            <a:avLst/>
+          </a:prstGeom>
+          <a:noFill/>
+        </p:spPr>
+        <p:txBody>
+          <a:bodyPr wrap="none" rtlCol="0">
+            <a:spAutoFit/>
+          </a:bodyPr>
+          <a:lstStyle/>
+          <a:p>
+            <a:r>
+              <a:rPr lang="en-US" sz="4600" dirty="0">
+                <a:solidFill>
+                  <a:srgbClr val="002C58"/>
+                </a:solidFill>
+                <a:latin typeface="Times New Roman" panose="02020603050405020304" pitchFamily="18" charset="0"/>
+                <a:cs typeface="Times New Roman" panose="02020603050405020304" pitchFamily="18" charset="0"/>
+              </a:rPr>
+              <a:t>IASE 2023 Satellite Conference</a:t>
+            </a:r>
+          </a:p>
+        </p:txBody>
+      </p:sp>
+      <p:sp>
+        <p:nvSpPr>
+          <p:cNvPr id="12" name="TextBox 11">
+            <a:extLst>
+              <a:ext uri="{FF2B5EF4-FFF2-40B4-BE49-F238E27FC236}">
+                <a16:creationId xmlns:a16="http://schemas.microsoft.com/office/drawing/2014/main" id="{80609BB9-8439-436C-4DE8-7CEDE2836F7C}"/>
+              </a:ext>
+            </a:extLst>
+          </p:cNvPr>
+          <p:cNvSpPr txBox="1"/>
+          <p:nvPr/>
+        </p:nvSpPr>
+        <p:spPr>
+          <a:xfrm>
+            <a:off x="2344992" y="2360868"/>
+            <a:ext cx="7718844" cy="954107"/>
+          </a:xfrm>
+          <a:prstGeom prst="rect">
+            <a:avLst/>
+          </a:prstGeom>
+          <a:noFill/>
+        </p:spPr>
+        <p:txBody>
+          <a:bodyPr wrap="none" rtlCol="0">
+            <a:spAutoFit/>
+          </a:bodyPr>
+          <a:lstStyle/>
+          <a:p>
+            <a:r>
+              <a:rPr lang="en-US" sz="2800" i="1" dirty="0">
+                <a:solidFill>
+                  <a:srgbClr val="002C58"/>
+                </a:solidFill>
+                <a:latin typeface="Times New Roman" panose="02020603050405020304" pitchFamily="18" charset="0"/>
+                <a:cs typeface="Times New Roman" panose="02020603050405020304" pitchFamily="18" charset="0"/>
+              </a:rPr>
+              <a:t>Fostering Learning of     Statistics and Data Science</a:t>
+            </a:r>
+          </a:p>
+          <a:p>
+            <a:r>
+              <a:rPr lang="en-CA" sz="2000" dirty="0">
+                <a:solidFill>
+                  <a:srgbClr val="002C58"/>
+                </a:solidFill>
+                <a:latin typeface="Times New Roman" panose="02020603050405020304" pitchFamily="18" charset="0"/>
+                <a:cs typeface="Times New Roman" panose="02020603050405020304" pitchFamily="18" charset="0"/>
+              </a:rPr>
+              <a:t>Hybrid Conference                               11-13 July 2023, Toronto, Canada</a:t>
+            </a:r>
+            <a:r>
+              <a:rPr lang="en-CA" sz="2800" dirty="0">
+                <a:solidFill>
+                  <a:srgbClr val="002C58"/>
+                </a:solidFill>
+                <a:latin typeface="Times New Roman" panose="02020603050405020304" pitchFamily="18" charset="0"/>
+                <a:cs typeface="Times New Roman" panose="02020603050405020304" pitchFamily="18" charset="0"/>
+              </a:rPr>
+              <a:t> </a:t>
+            </a:r>
+          </a:p>
+        </p:txBody>
+      </p:sp>
+      <p:pic>
+        <p:nvPicPr>
+          <p:cNvPr id="14" name="Picture 13">
+            <a:extLst>
+              <a:ext uri="{FF2B5EF4-FFF2-40B4-BE49-F238E27FC236}">
+                <a16:creationId xmlns:a16="http://schemas.microsoft.com/office/drawing/2014/main" id="{D1041CED-0E62-E04E-B617-D0999BDAD449}"/>
+              </a:ext>
+            </a:extLst>
+          </p:cNvPr>
+          <p:cNvPicPr>
+            <a:picLocks noChangeAspect="1"/>
+          </p:cNvPicPr>
+          <p:nvPr/>
+        </p:nvPicPr>
+        <p:blipFill>
+          <a:blip r:embed="rId5"/>
+          <a:stretch>
+            <a:fillRect/>
+          </a:stretch>
+        </p:blipFill>
+        <p:spPr>
+          <a:xfrm>
+            <a:off x="10060818" y="2806022"/>
+            <a:ext cx="1370293" cy="746502"/>
+          </a:xfrm>
+          <a:prstGeom prst="rect">
+            <a:avLst/>
+          </a:prstGeom>
+        </p:spPr>
+      </p:pic>
+    </p:spTree>
+    <p:extLst>
+      <p:ext uri="{BB962C8B-B14F-4D97-AF65-F5344CB8AC3E}">
+        <p14:creationId xmlns:p14="http://schemas.microsoft.com/office/powerpoint/2010/main" val="417199115"/>
+      </p:ext>
+    </p:extLst>
+  </p:cSld>
+  <p:clrMapOvr>
+    <a:masterClrMapping/>
+  </p:clrMapOvr>
+</p:sld>
+</file>
+
 <file path=ppt/theme/theme1.xml><?xml version="1.0" encoding="utf-8"?>
 <a:theme xmlns:a="http://schemas.openxmlformats.org/drawingml/2006/main" name="Office Theme">
   <a:themeElements>

</xml_diff>